<commit_message>
adding anime code to the pp
</commit_message>
<xml_diff>
--- a/Japan_presentation.pptx
+++ b/Japan_presentation.pptx
@@ -12,7 +12,8 @@
     <p:sldId id="262" r:id="rId6"/>
     <p:sldId id="260" r:id="rId7"/>
     <p:sldId id="261" r:id="rId8"/>
-    <p:sldId id="263" r:id="rId9"/>
+    <p:sldId id="264" r:id="rId9"/>
+    <p:sldId id="263" r:id="rId10"/>
   </p:sldIdLst>
   <p:sldSz cx="12192000" cy="6858000"/>
   <p:notesSz cx="6858000" cy="9144000"/>
@@ -8450,7 +8451,7 @@
           <a:lstStyle/>
           <a:p>
             <a:r>
-              <a:rPr lang="en-US"/>
+              <a:rPr lang="en-US" dirty="0"/>
               <a:t>Select a prefecture on the drop-down menu to see what shinkansen stations are there and what lines run through the prefecture</a:t>
             </a:r>
           </a:p>
@@ -8689,6 +8690,406 @@
 </file>
 
 <file path=ppt/slides/slide8.xml><?xml version="1.0" encoding="utf-8"?>
+<p:sld xmlns:a="http://schemas.openxmlformats.org/drawingml/2006/main" xmlns:r="http://schemas.openxmlformats.org/officeDocument/2006/relationships" xmlns:p="http://schemas.openxmlformats.org/presentationml/2006/main">
+  <p:cSld>
+    <p:bg>
+      <p:bgPr>
+        <a:solidFill>
+          <a:schemeClr val="bg1"/>
+        </a:solidFill>
+        <a:effectLst/>
+      </p:bgPr>
+    </p:bg>
+    <p:spTree>
+      <p:nvGrpSpPr>
+        <p:cNvPr id="1" name=""/>
+        <p:cNvGrpSpPr/>
+        <p:nvPr/>
+      </p:nvGrpSpPr>
+      <p:grpSpPr>
+        <a:xfrm>
+          <a:off x="0" y="0"/>
+          <a:ext cx="0" cy="0"/>
+          <a:chOff x="0" y="0"/>
+          <a:chExt cx="0" cy="0"/>
+        </a:xfrm>
+      </p:grpSpPr>
+      <p:sp useBgFill="1">
+        <p:nvSpPr>
+          <p:cNvPr id="14" name="Rectangle 13">
+            <a:extLst>
+              <a:ext uri="{FF2B5EF4-FFF2-40B4-BE49-F238E27FC236}">
+                <a16:creationId xmlns:a16="http://schemas.microsoft.com/office/drawing/2014/main" id="{058A14AF-9FB5-4CC7-BA35-E8E85D3EDF0E}"/>
+              </a:ext>
+              <a:ext uri="{C183D7F6-B498-43B3-948B-1728B52AA6E4}">
+                <adec:decorative xmlns:adec="http://schemas.microsoft.com/office/drawing/2017/decorative" val="1"/>
+              </a:ext>
+            </a:extLst>
+          </p:cNvPr>
+          <p:cNvSpPr>
+            <a:spLocks noGrp="1" noRot="1" noChangeAspect="1" noMove="1" noResize="1" noEditPoints="1" noAdjustHandles="1" noChangeArrowheads="1" noChangeShapeType="1" noTextEdit="1"/>
+          </p:cNvSpPr>
+          <p:nvPr>
+            <p:extLst>
+              <p:ext uri="{386F3935-93C4-4BCD-93E2-E3B085C9AB24}">
+                <p16:designElem xmlns:p16="http://schemas.microsoft.com/office/powerpoint/2015/main" val="1"/>
+              </p:ext>
+            </p:extLst>
+          </p:nvPr>
+        </p:nvSpPr>
+        <p:spPr>
+          <a:xfrm>
+            <a:off x="0" y="0"/>
+            <a:ext cx="12191999" cy="6857365"/>
+          </a:xfrm>
+          <a:prstGeom prst="rect">
+            <a:avLst/>
+          </a:prstGeom>
+          <a:ln>
+            <a:noFill/>
+          </a:ln>
+        </p:spPr>
+        <p:style>
+          <a:lnRef idx="2">
+            <a:schemeClr val="accent1">
+              <a:shade val="50000"/>
+            </a:schemeClr>
+          </a:lnRef>
+          <a:fillRef idx="1">
+            <a:schemeClr val="accent1"/>
+          </a:fillRef>
+          <a:effectRef idx="0">
+            <a:schemeClr val="accent1"/>
+          </a:effectRef>
+          <a:fontRef idx="minor">
+            <a:schemeClr val="lt1"/>
+          </a:fontRef>
+        </p:style>
+        <p:txBody>
+          <a:bodyPr rtlCol="0" anchor="ctr"/>
+          <a:lstStyle/>
+          <a:p>
+            <a:pPr algn="ctr"/>
+            <a:endParaRPr lang="en-US"/>
+          </a:p>
+        </p:txBody>
+      </p:sp>
+      <p:sp>
+        <p:nvSpPr>
+          <p:cNvPr id="2" name="Title 1">
+            <a:extLst>
+              <a:ext uri="{FF2B5EF4-FFF2-40B4-BE49-F238E27FC236}">
+                <a16:creationId xmlns:a16="http://schemas.microsoft.com/office/drawing/2014/main" id="{DD45BF57-2A97-BC28-DA0A-A63D72BAC96E}"/>
+              </a:ext>
+            </a:extLst>
+          </p:cNvPr>
+          <p:cNvSpPr>
+            <a:spLocks noGrp="1"/>
+          </p:cNvSpPr>
+          <p:nvPr>
+            <p:ph type="title"/>
+          </p:nvPr>
+        </p:nvSpPr>
+        <p:spPr>
+          <a:xfrm>
+            <a:off x="793662" y="386930"/>
+            <a:ext cx="10066122" cy="1298448"/>
+          </a:xfrm>
+        </p:spPr>
+        <p:txBody>
+          <a:bodyPr anchor="b">
+            <a:normAutofit/>
+          </a:bodyPr>
+          <a:lstStyle/>
+          <a:p>
+            <a:r>
+              <a:rPr lang="en-US" sz="4800" dirty="0"/>
+              <a:t>Code For Animation</a:t>
+            </a:r>
+          </a:p>
+        </p:txBody>
+      </p:sp>
+      <p:sp>
+        <p:nvSpPr>
+          <p:cNvPr id="16" name="Rectangle 15">
+            <a:extLst>
+              <a:ext uri="{FF2B5EF4-FFF2-40B4-BE49-F238E27FC236}">
+                <a16:creationId xmlns:a16="http://schemas.microsoft.com/office/drawing/2014/main" id="{3A9A4357-BD1D-4622-A4FE-766E6AB8DE84}"/>
+              </a:ext>
+              <a:ext uri="{C183D7F6-B498-43B3-948B-1728B52AA6E4}">
+                <adec:decorative xmlns:adec="http://schemas.microsoft.com/office/drawing/2017/decorative" val="1"/>
+              </a:ext>
+            </a:extLst>
+          </p:cNvPr>
+          <p:cNvSpPr>
+            <a:spLocks noGrp="1" noRot="1" noChangeAspect="1" noMove="1" noResize="1" noEditPoints="1" noAdjustHandles="1" noChangeArrowheads="1" noChangeShapeType="1" noTextEdit="1"/>
+          </p:cNvSpPr>
+          <p:nvPr>
+            <p:extLst>
+              <p:ext uri="{386F3935-93C4-4BCD-93E2-E3B085C9AB24}">
+                <p16:designElem xmlns:p16="http://schemas.microsoft.com/office/powerpoint/2015/main" val="1"/>
+              </p:ext>
+            </p:extLst>
+          </p:nvPr>
+        </p:nvSpPr>
+        <p:spPr>
+          <a:xfrm flipH="1" flipV="1">
+            <a:off x="-2" y="1998845"/>
+            <a:ext cx="11454595" cy="781699"/>
+          </a:xfrm>
+          <a:prstGeom prst="rect">
+            <a:avLst/>
+          </a:prstGeom>
+          <a:solidFill>
+            <a:schemeClr val="accent4"/>
+          </a:solidFill>
+          <a:ln>
+            <a:noFill/>
+          </a:ln>
+        </p:spPr>
+        <p:style>
+          <a:lnRef idx="2">
+            <a:schemeClr val="accent1">
+              <a:shade val="50000"/>
+            </a:schemeClr>
+          </a:lnRef>
+          <a:fillRef idx="1">
+            <a:schemeClr val="accent1"/>
+          </a:fillRef>
+          <a:effectRef idx="0">
+            <a:schemeClr val="accent1"/>
+          </a:effectRef>
+          <a:fontRef idx="minor">
+            <a:schemeClr val="lt1"/>
+          </a:fontRef>
+        </p:style>
+        <p:txBody>
+          <a:bodyPr rtlCol="0" anchor="ctr"/>
+          <a:lstStyle/>
+          <a:p>
+            <a:pPr algn="ctr"/>
+            <a:endParaRPr lang="en-US"/>
+          </a:p>
+        </p:txBody>
+      </p:sp>
+      <p:sp>
+        <p:nvSpPr>
+          <p:cNvPr id="18" name="Rectangle 17">
+            <a:extLst>
+              <a:ext uri="{FF2B5EF4-FFF2-40B4-BE49-F238E27FC236}">
+                <a16:creationId xmlns:a16="http://schemas.microsoft.com/office/drawing/2014/main" id="{E659831F-0D9A-4C63-9EBB-8435B85A440F}"/>
+              </a:ext>
+              <a:ext uri="{C183D7F6-B498-43B3-948B-1728B52AA6E4}">
+                <adec:decorative xmlns:adec="http://schemas.microsoft.com/office/drawing/2017/decorative" val="1"/>
+              </a:ext>
+            </a:extLst>
+          </p:cNvPr>
+          <p:cNvSpPr>
+            <a:spLocks noGrp="1" noRot="1" noChangeAspect="1" noMove="1" noResize="1" noEditPoints="1" noAdjustHandles="1" noChangeArrowheads="1" noChangeShapeType="1" noTextEdit="1"/>
+          </p:cNvSpPr>
+          <p:nvPr>
+            <p:extLst>
+              <p:ext uri="{386F3935-93C4-4BCD-93E2-E3B085C9AB24}">
+                <p16:designElem xmlns:p16="http://schemas.microsoft.com/office/powerpoint/2015/main" val="1"/>
+              </p:ext>
+            </p:extLst>
+          </p:nvPr>
+        </p:nvSpPr>
+        <p:spPr>
+          <a:xfrm>
+            <a:off x="0" y="2203079"/>
+            <a:ext cx="11383362" cy="4267991"/>
+          </a:xfrm>
+          <a:prstGeom prst="rect">
+            <a:avLst/>
+          </a:prstGeom>
+          <a:solidFill>
+            <a:schemeClr val="bg1"/>
+          </a:solidFill>
+          <a:ln>
+            <a:noFill/>
+          </a:ln>
+          <a:effectLst>
+            <a:outerShdw blurRad="139700" dist="127000" dir="5400000" algn="t" rotWithShape="0">
+              <a:prstClr val="black">
+                <a:alpha val="15000"/>
+              </a:prstClr>
+            </a:outerShdw>
+          </a:effectLst>
+        </p:spPr>
+        <p:style>
+          <a:lnRef idx="2">
+            <a:schemeClr val="accent1">
+              <a:shade val="50000"/>
+            </a:schemeClr>
+          </a:lnRef>
+          <a:fillRef idx="1">
+            <a:schemeClr val="accent1"/>
+          </a:fillRef>
+          <a:effectRef idx="0">
+            <a:schemeClr val="accent1"/>
+          </a:effectRef>
+          <a:fontRef idx="minor">
+            <a:schemeClr val="lt1"/>
+          </a:fontRef>
+        </p:style>
+        <p:txBody>
+          <a:bodyPr rtlCol="0" anchor="ctr"/>
+          <a:lstStyle/>
+          <a:p>
+            <a:pPr algn="ctr"/>
+            <a:endParaRPr lang="en-US"/>
+          </a:p>
+        </p:txBody>
+      </p:sp>
+      <p:sp>
+        <p:nvSpPr>
+          <p:cNvPr id="11" name="Content Placeholder 10">
+            <a:extLst>
+              <a:ext uri="{FF2B5EF4-FFF2-40B4-BE49-F238E27FC236}">
+                <a16:creationId xmlns:a16="http://schemas.microsoft.com/office/drawing/2014/main" id="{321A6DF4-7ED5-12EF-1B6C-5585CD939AA9}"/>
+              </a:ext>
+            </a:extLst>
+          </p:cNvPr>
+          <p:cNvSpPr>
+            <a:spLocks noGrp="1"/>
+          </p:cNvSpPr>
+          <p:nvPr>
+            <p:ph idx="1"/>
+          </p:nvPr>
+        </p:nvSpPr>
+        <p:spPr>
+          <a:xfrm>
+            <a:off x="319985" y="2567563"/>
+            <a:ext cx="3310604" cy="3639450"/>
+          </a:xfrm>
+        </p:spPr>
+        <p:txBody>
+          <a:bodyPr anchor="ctr">
+            <a:normAutofit/>
+          </a:bodyPr>
+          <a:lstStyle/>
+          <a:p>
+            <a:r>
+              <a:rPr lang="en-US" dirty="0"/>
+              <a:t>Anime JavaScript library used to animate the title and subtitle</a:t>
+            </a:r>
+          </a:p>
+        </p:txBody>
+      </p:sp>
+      <p:pic>
+        <p:nvPicPr>
+          <p:cNvPr id="7" name="Content Placeholder 6" descr="A screen shot of a computer program&#10;&#10;Description automatically generated">
+            <a:extLst>
+              <a:ext uri="{FF2B5EF4-FFF2-40B4-BE49-F238E27FC236}">
+                <a16:creationId xmlns:a16="http://schemas.microsoft.com/office/drawing/2014/main" id="{B091C265-6F03-926A-FA6C-8A2064B05661}"/>
+              </a:ext>
+            </a:extLst>
+          </p:cNvPr>
+          <p:cNvPicPr>
+            <a:picLocks noChangeAspect="1"/>
+          </p:cNvPicPr>
+          <p:nvPr/>
+        </p:nvPicPr>
+        <p:blipFill>
+          <a:blip r:embed="rId2">
+            <a:extLst>
+              <a:ext uri="{28A0092B-C50C-407E-A947-70E740481C1C}">
+                <a14:useLocalDpi xmlns:a14="http://schemas.microsoft.com/office/drawing/2010/main" val="0"/>
+              </a:ext>
+            </a:extLst>
+          </a:blip>
+          <a:stretch>
+            <a:fillRect/>
+          </a:stretch>
+        </p:blipFill>
+        <p:spPr>
+          <a:xfrm>
+            <a:off x="3647267" y="3024768"/>
+            <a:ext cx="8224748" cy="3639450"/>
+          </a:xfrm>
+          <a:prstGeom prst="rect">
+            <a:avLst/>
+          </a:prstGeom>
+        </p:spPr>
+      </p:pic>
+      <p:sp>
+        <p:nvSpPr>
+          <p:cNvPr id="20" name="Rectangle 19">
+            <a:extLst>
+              <a:ext uri="{FF2B5EF4-FFF2-40B4-BE49-F238E27FC236}">
+                <a16:creationId xmlns:a16="http://schemas.microsoft.com/office/drawing/2014/main" id="{E6995CE5-F890-4ABA-82A2-26507CE8D2A3}"/>
+              </a:ext>
+              <a:ext uri="{C183D7F6-B498-43B3-948B-1728B52AA6E4}">
+                <adec:decorative xmlns:adec="http://schemas.microsoft.com/office/drawing/2017/decorative" val="1"/>
+              </a:ext>
+            </a:extLst>
+          </p:cNvPr>
+          <p:cNvSpPr>
+            <a:spLocks noGrp="1" noRot="1" noChangeAspect="1" noMove="1" noResize="1" noEditPoints="1" noAdjustHandles="1" noChangeArrowheads="1" noChangeShapeType="1" noTextEdit="1"/>
+          </p:cNvSpPr>
+          <p:nvPr>
+            <p:extLst>
+              <p:ext uri="{386F3935-93C4-4BCD-93E2-E3B085C9AB24}">
+                <p16:designElem xmlns:p16="http://schemas.microsoft.com/office/powerpoint/2015/main" val="1"/>
+              </p:ext>
+            </p:extLst>
+          </p:nvPr>
+        </p:nvSpPr>
+        <p:spPr>
+          <a:xfrm rot="5400000">
+            <a:off x="11228040" y="2313027"/>
+            <a:ext cx="781700" cy="152382"/>
+          </a:xfrm>
+          <a:prstGeom prst="rect">
+            <a:avLst/>
+          </a:prstGeom>
+          <a:solidFill>
+            <a:schemeClr val="accent4"/>
+          </a:solidFill>
+          <a:ln>
+            <a:noFill/>
+          </a:ln>
+        </p:spPr>
+        <p:style>
+          <a:lnRef idx="2">
+            <a:schemeClr val="accent1">
+              <a:shade val="50000"/>
+            </a:schemeClr>
+          </a:lnRef>
+          <a:fillRef idx="1">
+            <a:schemeClr val="accent1"/>
+          </a:fillRef>
+          <a:effectRef idx="0">
+            <a:schemeClr val="accent1"/>
+          </a:effectRef>
+          <a:fontRef idx="minor">
+            <a:schemeClr val="lt1"/>
+          </a:fontRef>
+        </p:style>
+        <p:txBody>
+          <a:bodyPr rtlCol="0" anchor="ctr"/>
+          <a:lstStyle/>
+          <a:p>
+            <a:pPr algn="ctr"/>
+            <a:endParaRPr lang="en-US"/>
+          </a:p>
+        </p:txBody>
+      </p:sp>
+    </p:spTree>
+    <p:extLst>
+      <p:ext uri="{BB962C8B-B14F-4D97-AF65-F5344CB8AC3E}">
+        <p14:creationId xmlns:p14="http://schemas.microsoft.com/office/powerpoint/2010/main" val="4023141838"/>
+      </p:ext>
+    </p:extLst>
+  </p:cSld>
+  <p:clrMapOvr>
+    <a:masterClrMapping/>
+  </p:clrMapOvr>
+</p:sld>
+</file>
+
+<file path=ppt/slides/slide9.xml><?xml version="1.0" encoding="utf-8"?>
 <p:sld xmlns:a="http://schemas.openxmlformats.org/drawingml/2006/main" xmlns:r="http://schemas.openxmlformats.org/officeDocument/2006/relationships" xmlns:p="http://schemas.openxmlformats.org/presentationml/2006/main">
   <p:cSld>
     <p:bg>

</xml_diff>